<commit_message>
Clase 4 - Repaso
</commit_message>
<xml_diff>
--- a/Clase2/Práctica 2.pptx
+++ b/Clase2/Práctica 2.pptx
@@ -349,7 +349,7 @@
           <a:p>
             <a:fld id="{4304A1EF-9104-4B8A-9F94-E051281D2A6D}" type="datetimeFigureOut">
               <a:rPr lang="es-CO" smtClean="0"/>
-              <a:t>1/02/2019</a:t>
+              <a:t>15/02/2019</a:t>
             </a:fld>
             <a:endParaRPr lang="es-CO"/>
           </a:p>
@@ -557,7 +557,7 @@
           <a:p>
             <a:fld id="{4304A1EF-9104-4B8A-9F94-E051281D2A6D}" type="datetimeFigureOut">
               <a:rPr lang="es-CO" smtClean="0"/>
-              <a:t>1/02/2019</a:t>
+              <a:t>15/02/2019</a:t>
             </a:fld>
             <a:endParaRPr lang="es-CO"/>
           </a:p>
@@ -813,7 +813,7 @@
           <a:p>
             <a:fld id="{4304A1EF-9104-4B8A-9F94-E051281D2A6D}" type="datetimeFigureOut">
               <a:rPr lang="es-CO" smtClean="0"/>
-              <a:t>1/02/2019</a:t>
+              <a:t>15/02/2019</a:t>
             </a:fld>
             <a:endParaRPr lang="es-CO"/>
           </a:p>
@@ -983,7 +983,7 @@
           <a:p>
             <a:fld id="{4304A1EF-9104-4B8A-9F94-E051281D2A6D}" type="datetimeFigureOut">
               <a:rPr lang="es-CO" smtClean="0"/>
-              <a:t>1/02/2019</a:t>
+              <a:t>15/02/2019</a:t>
             </a:fld>
             <a:endParaRPr lang="es-CO"/>
           </a:p>
@@ -1326,7 +1326,7 @@
           <a:p>
             <a:fld id="{4304A1EF-9104-4B8A-9F94-E051281D2A6D}" type="datetimeFigureOut">
               <a:rPr lang="es-CO" smtClean="0"/>
-              <a:t>1/02/2019</a:t>
+              <a:t>15/02/2019</a:t>
             </a:fld>
             <a:endParaRPr lang="es-CO"/>
           </a:p>
@@ -1601,7 +1601,7 @@
           <a:p>
             <a:fld id="{4304A1EF-9104-4B8A-9F94-E051281D2A6D}" type="datetimeFigureOut">
               <a:rPr lang="es-CO" smtClean="0"/>
-              <a:t>1/02/2019</a:t>
+              <a:t>15/02/2019</a:t>
             </a:fld>
             <a:endParaRPr lang="es-CO"/>
           </a:p>
@@ -1980,7 +1980,7 @@
           <a:p>
             <a:fld id="{4304A1EF-9104-4B8A-9F94-E051281D2A6D}" type="datetimeFigureOut">
               <a:rPr lang="es-CO" smtClean="0"/>
-              <a:t>1/02/2019</a:t>
+              <a:t>15/02/2019</a:t>
             </a:fld>
             <a:endParaRPr lang="es-CO"/>
           </a:p>
@@ -2098,7 +2098,7 @@
           <a:p>
             <a:fld id="{4304A1EF-9104-4B8A-9F94-E051281D2A6D}" type="datetimeFigureOut">
               <a:rPr lang="es-CO" smtClean="0"/>
-              <a:t>1/02/2019</a:t>
+              <a:t>15/02/2019</a:t>
             </a:fld>
             <a:endParaRPr lang="es-CO"/>
           </a:p>
@@ -2269,7 +2269,7 @@
           <a:p>
             <a:fld id="{4304A1EF-9104-4B8A-9F94-E051281D2A6D}" type="datetimeFigureOut">
               <a:rPr lang="es-CO" smtClean="0"/>
-              <a:t>1/02/2019</a:t>
+              <a:t>15/02/2019</a:t>
             </a:fld>
             <a:endParaRPr lang="es-CO"/>
           </a:p>
@@ -2623,7 +2623,7 @@
           <a:p>
             <a:fld id="{4304A1EF-9104-4B8A-9F94-E051281D2A6D}" type="datetimeFigureOut">
               <a:rPr lang="es-CO" smtClean="0"/>
-              <a:t>1/02/2019</a:t>
+              <a:t>15/02/2019</a:t>
             </a:fld>
             <a:endParaRPr lang="es-CO"/>
           </a:p>
@@ -3000,7 +3000,7 @@
           <a:p>
             <a:fld id="{4304A1EF-9104-4B8A-9F94-E051281D2A6D}" type="datetimeFigureOut">
               <a:rPr lang="es-CO" smtClean="0"/>
-              <a:t>1/02/2019</a:t>
+              <a:t>15/02/2019</a:t>
             </a:fld>
             <a:endParaRPr lang="es-CO"/>
           </a:p>
@@ -3287,7 +3287,7 @@
           <a:p>
             <a:fld id="{4304A1EF-9104-4B8A-9F94-E051281D2A6D}" type="datetimeFigureOut">
               <a:rPr lang="es-CO" smtClean="0"/>
-              <a:t>1/02/2019</a:t>
+              <a:t>15/02/2019</a:t>
             </a:fld>
             <a:endParaRPr lang="es-CO"/>
           </a:p>
@@ -6323,17 +6323,20 @@
           </a:p>
           <a:p>
             <a:r>
-              <a:rPr lang="es-ES" sz="1600" dirty="0" err="1">
+              <a:rPr lang="es-ES" sz="1600" dirty="0" err="1" smtClean="0">
                 <a:latin typeface="Consolas" panose="020B0609020204030204" pitchFamily="49" charset="0"/>
               </a:rPr>
               <a:t>Serial.println</a:t>
             </a:r>
             <a:r>
-              <a:rPr lang="es-ES" sz="1600" dirty="0">
+              <a:rPr lang="es-ES" sz="1600" dirty="0" smtClean="0">
                 <a:latin typeface="Consolas" panose="020B0609020204030204" pitchFamily="49" charset="0"/>
               </a:rPr>
               <a:t>(sobre);</a:t>
             </a:r>
+            <a:endParaRPr lang="es-ES" sz="1600" dirty="0">
+              <a:latin typeface="Consolas" panose="020B0609020204030204" pitchFamily="49" charset="0"/>
+            </a:endParaRPr>
           </a:p>
         </p:txBody>
       </p:sp>

</xml_diff>